<commit_message>
pushing changes to chart coding and power point changes
</commit_message>
<xml_diff>
--- a/Group Project one .pptx
+++ b/Group Project one .pptx
@@ -113,6 +113,11 @@
       </a:defRPr>
     </a:lvl9pPr>
   </p:defaultTextStyle>
+  <p:extLst>
+    <p:ext uri="{EFAFB233-063F-42B5-8137-9DF3F51BA10A}">
+      <p15:sldGuideLst xmlns:p15="http://schemas.microsoft.com/office/powerpoint/2012/main"/>
+    </p:ext>
+  </p:extLst>
 </p:presentation>
 </file>
 
@@ -286,7 +291,7 @@
           <a:p>
             <a:fld id="{48A87A34-81AB-432B-8DAE-1953F412C126}" type="datetimeFigureOut">
               <a:rPr lang="en-US" dirty="0"/>
-              <a:t>1/17/19</a:t>
+              <a:t>1/19/2019</a:t>
             </a:fld>
             <a:endParaRPr lang="en-US" dirty="0"/>
           </a:p>
@@ -548,7 +553,7 @@
           <a:p>
             <a:fld id="{48A87A34-81AB-432B-8DAE-1953F412C126}" type="datetimeFigureOut">
               <a:rPr lang="en-US" dirty="0"/>
-              <a:t>1/17/19</a:t>
+              <a:t>1/19/2019</a:t>
             </a:fld>
             <a:endParaRPr lang="en-US" dirty="0"/>
           </a:p>
@@ -775,7 +780,7 @@
             <a:fld id="{48A87A34-81AB-432B-8DAE-1953F412C126}" type="datetimeFigureOut">
               <a:rPr lang="en-US" dirty="0"/>
               <a:pPr/>
-              <a:t>1/17/19</a:t>
+              <a:t>1/19/2019</a:t>
             </a:fld>
             <a:endParaRPr lang="en-US" dirty="0"/>
           </a:p>
@@ -1081,7 +1086,7 @@
             <a:fld id="{48A87A34-81AB-432B-8DAE-1953F412C126}" type="datetimeFigureOut">
               <a:rPr lang="en-US" dirty="0"/>
               <a:pPr/>
-              <a:t>1/17/19</a:t>
+              <a:t>1/19/2019</a:t>
             </a:fld>
             <a:endParaRPr lang="en-US" dirty="0"/>
           </a:p>
@@ -1550,7 +1555,7 @@
             <a:fld id="{48A87A34-81AB-432B-8DAE-1953F412C126}" type="datetimeFigureOut">
               <a:rPr lang="en-US" dirty="0"/>
               <a:pPr/>
-              <a:t>1/17/19</a:t>
+              <a:t>1/19/2019</a:t>
             </a:fld>
             <a:endParaRPr lang="en-US" dirty="0"/>
           </a:p>
@@ -2092,7 +2097,7 @@
           <a:p>
             <a:fld id="{48A87A34-81AB-432B-8DAE-1953F412C126}" type="datetimeFigureOut">
               <a:rPr lang="en-US" dirty="0"/>
-              <a:t>1/17/19</a:t>
+              <a:t>1/19/2019</a:t>
             </a:fld>
             <a:endParaRPr lang="en-US" dirty="0"/>
           </a:p>
@@ -2861,7 +2866,7 @@
           <a:p>
             <a:fld id="{48A87A34-81AB-432B-8DAE-1953F412C126}" type="datetimeFigureOut">
               <a:rPr lang="en-US" dirty="0"/>
-              <a:t>1/17/19</a:t>
+              <a:t>1/19/2019</a:t>
             </a:fld>
             <a:endParaRPr lang="en-US" dirty="0"/>
           </a:p>
@@ -3031,7 +3036,7 @@
           <a:p>
             <a:fld id="{48A87A34-81AB-432B-8DAE-1953F412C126}" type="datetimeFigureOut">
               <a:rPr lang="en-US" dirty="0"/>
-              <a:t>1/17/19</a:t>
+              <a:t>1/19/2019</a:t>
             </a:fld>
             <a:endParaRPr lang="en-US" dirty="0"/>
           </a:p>
@@ -3250,7 +3255,7 @@
             <a:fld id="{48A87A34-81AB-432B-8DAE-1953F412C126}" type="datetimeFigureOut">
               <a:rPr lang="en-US" dirty="0"/>
               <a:pPr/>
-              <a:t>1/17/19</a:t>
+              <a:t>1/19/2019</a:t>
             </a:fld>
             <a:endParaRPr lang="en-US" dirty="0"/>
           </a:p>
@@ -3425,7 +3430,7 @@
           <a:p>
             <a:fld id="{48A87A34-81AB-432B-8DAE-1953F412C126}" type="datetimeFigureOut">
               <a:rPr lang="en-US" dirty="0"/>
-              <a:t>1/17/19</a:t>
+              <a:t>1/19/2019</a:t>
             </a:fld>
             <a:endParaRPr lang="en-US" dirty="0"/>
           </a:p>
@@ -3710,7 +3715,7 @@
             <a:fld id="{48A87A34-81AB-432B-8DAE-1953F412C126}" type="datetimeFigureOut">
               <a:rPr lang="en-US" dirty="0"/>
               <a:pPr/>
-              <a:t>1/17/19</a:t>
+              <a:t>1/19/2019</a:t>
             </a:fld>
             <a:endParaRPr lang="en-US" dirty="0"/>
           </a:p>
@@ -3947,7 +3952,7 @@
           <a:p>
             <a:fld id="{48A87A34-81AB-432B-8DAE-1953F412C126}" type="datetimeFigureOut">
               <a:rPr lang="en-US" dirty="0"/>
-              <a:t>1/17/19</a:t>
+              <a:t>1/19/2019</a:t>
             </a:fld>
             <a:endParaRPr lang="en-US" dirty="0"/>
           </a:p>
@@ -4321,7 +4326,7 @@
           <a:p>
             <a:fld id="{48A87A34-81AB-432B-8DAE-1953F412C126}" type="datetimeFigureOut">
               <a:rPr lang="en-US" dirty="0"/>
-              <a:t>1/17/19</a:t>
+              <a:t>1/19/2019</a:t>
             </a:fld>
             <a:endParaRPr lang="en-US" dirty="0"/>
           </a:p>
@@ -4434,7 +4439,7 @@
           <a:p>
             <a:fld id="{48A87A34-81AB-432B-8DAE-1953F412C126}" type="datetimeFigureOut">
               <a:rPr lang="en-US" dirty="0"/>
-              <a:t>1/17/19</a:t>
+              <a:t>1/19/2019</a:t>
             </a:fld>
             <a:endParaRPr lang="en-US" dirty="0"/>
           </a:p>
@@ -4524,7 +4529,7 @@
           <a:p>
             <a:fld id="{48A87A34-81AB-432B-8DAE-1953F412C126}" type="datetimeFigureOut">
               <a:rPr lang="en-US" dirty="0"/>
-              <a:t>1/17/19</a:t>
+              <a:t>1/19/2019</a:t>
             </a:fld>
             <a:endParaRPr lang="en-US" dirty="0"/>
           </a:p>
@@ -4768,7 +4773,7 @@
           <a:p>
             <a:fld id="{48A87A34-81AB-432B-8DAE-1953F412C126}" type="datetimeFigureOut">
               <a:rPr lang="en-US" dirty="0"/>
-              <a:t>1/17/19</a:t>
+              <a:t>1/19/2019</a:t>
             </a:fld>
             <a:endParaRPr lang="en-US" dirty="0"/>
           </a:p>
@@ -5020,7 +5025,7 @@
           <a:p>
             <a:fld id="{48A87A34-81AB-432B-8DAE-1953F412C126}" type="datetimeFigureOut">
               <a:rPr lang="en-US" dirty="0"/>
-              <a:t>1/17/19</a:t>
+              <a:t>1/19/2019</a:t>
             </a:fld>
             <a:endParaRPr lang="en-US" dirty="0"/>
           </a:p>
@@ -5259,7 +5264,7 @@
             <a:fld id="{48A87A34-81AB-432B-8DAE-1953F412C126}" type="datetimeFigureOut">
               <a:rPr lang="en-US" dirty="0"/>
               <a:pPr/>
-              <a:t>1/17/19</a:t>
+              <a:t>1/19/2019</a:t>
             </a:fld>
             <a:endParaRPr lang="en-US" dirty="0"/>
           </a:p>
@@ -6040,31 +6045,35 @@
           </a:p>
         </p:txBody>
       </p:sp>
-      <p:sp>
-        <p:nvSpPr>
-          <p:cNvPr id="3" name="Content Placeholder 2">
+      <p:pic>
+        <p:nvPicPr>
+          <p:cNvPr id="17" name="Content Placeholder 16">
             <a:extLst>
               <a:ext uri="{FF2B5EF4-FFF2-40B4-BE49-F238E27FC236}">
-                <a16:creationId xmlns:a16="http://schemas.microsoft.com/office/drawing/2014/main" id="{0BC6E3C2-8AEE-2B4D-9BC9-5A1ACD713A50}"/>
+                <a16:creationId xmlns:a16="http://schemas.microsoft.com/office/drawing/2014/main" id="{70F59381-5A80-4767-8FE0-C7F559193CC6}"/>
               </a:ext>
             </a:extLst>
           </p:cNvPr>
-          <p:cNvSpPr>
-            <a:spLocks noGrp="1"/>
-          </p:cNvSpPr>
+          <p:cNvPicPr>
+            <a:picLocks noGrp="1" noChangeAspect="1"/>
+          </p:cNvPicPr>
           <p:nvPr>
             <p:ph idx="1"/>
           </p:nvPr>
-        </p:nvSpPr>
-        <p:spPr/>
-        <p:txBody>
-          <a:bodyPr/>
-          <a:lstStyle/>
-          <a:p>
-            <a:endParaRPr lang="en-US" dirty="0"/>
-          </a:p>
-        </p:txBody>
-      </p:sp>
+        </p:nvPicPr>
+        <p:blipFill>
+          <a:blip r:embed="rId2"/>
+          <a:stretch>
+            <a:fillRect/>
+          </a:stretch>
+        </p:blipFill>
+        <p:spPr>
+          <a:xfrm>
+            <a:off x="2993925" y="1921542"/>
+            <a:ext cx="6204149" cy="4024313"/>
+          </a:xfrm>
+        </p:spPr>
+      </p:pic>
     </p:spTree>
     <p:extLst>
       <p:ext uri="{BB962C8B-B14F-4D97-AF65-F5344CB8AC3E}">
@@ -6111,14 +6120,16 @@
             <p:ph type="title"/>
           </p:nvPr>
         </p:nvSpPr>
-        <p:spPr/>
-        <p:txBody>
-          <a:bodyPr/>
-          <a:lstStyle/>
-          <a:p>
-            <a:br>
-              <a:rPr lang="en-US" dirty="0"/>
-            </a:br>
+        <p:spPr>
+          <a:xfrm>
+            <a:off x="2895600" y="764373"/>
+            <a:ext cx="8610600" cy="976878"/>
+          </a:xfrm>
+        </p:spPr>
+        <p:txBody>
+          <a:bodyPr/>
+          <a:lstStyle/>
+          <a:p>
             <a:r>
               <a:rPr lang="en-US" dirty="0"/>
               <a:t>Economy : salary</a:t>
@@ -6126,31 +6137,35 @@
           </a:p>
         </p:txBody>
       </p:sp>
-      <p:sp>
-        <p:nvSpPr>
-          <p:cNvPr id="3" name="Content Placeholder 2">
+      <p:pic>
+        <p:nvPicPr>
+          <p:cNvPr id="5" name="Content Placeholder 4">
             <a:extLst>
               <a:ext uri="{FF2B5EF4-FFF2-40B4-BE49-F238E27FC236}">
-                <a16:creationId xmlns:a16="http://schemas.microsoft.com/office/drawing/2014/main" id="{FF73F815-0056-AE43-82C2-FDA29FD92196}"/>
+                <a16:creationId xmlns:a16="http://schemas.microsoft.com/office/drawing/2014/main" id="{A3A5A1CF-DEC6-403A-9015-B6E9C976B5BB}"/>
               </a:ext>
             </a:extLst>
           </p:cNvPr>
-          <p:cNvSpPr>
-            <a:spLocks noGrp="1"/>
-          </p:cNvSpPr>
+          <p:cNvPicPr>
+            <a:picLocks noGrp="1" noChangeAspect="1"/>
+          </p:cNvPicPr>
           <p:nvPr>
             <p:ph idx="1"/>
           </p:nvPr>
-        </p:nvSpPr>
-        <p:spPr/>
-        <p:txBody>
-          <a:bodyPr/>
-          <a:lstStyle/>
-          <a:p>
-            <a:endParaRPr lang="en-US"/>
-          </a:p>
-        </p:txBody>
-      </p:sp>
+        </p:nvPicPr>
+        <p:blipFill>
+          <a:blip r:embed="rId2"/>
+          <a:stretch>
+            <a:fillRect/>
+          </a:stretch>
+        </p:blipFill>
+        <p:spPr>
+          <a:xfrm>
+            <a:off x="2990088" y="1920240"/>
+            <a:ext cx="6208776" cy="4051287"/>
+          </a:xfrm>
+        </p:spPr>
+      </p:pic>
     </p:spTree>
     <p:extLst>
       <p:ext uri="{BB962C8B-B14F-4D97-AF65-F5344CB8AC3E}">

</xml_diff>

<commit_message>
replaced charts to newest versions
</commit_message>
<xml_diff>
--- a/Group Project one .pptx
+++ b/Group Project one .pptx
@@ -7465,12 +7465,45 @@
           </a:p>
         </p:txBody>
       </p:sp>
+      <p:sp>
+        <p:nvSpPr>
+          <p:cNvPr id="3" name="Footer Placeholder 2">
+            <a:extLst>
+              <a:ext uri="{FF2B5EF4-FFF2-40B4-BE49-F238E27FC236}">
+                <a16:creationId xmlns:a16="http://schemas.microsoft.com/office/drawing/2014/main" id="{8B4E291D-D615-4D68-9909-0E26081B3315}"/>
+              </a:ext>
+            </a:extLst>
+          </p:cNvPr>
+          <p:cNvSpPr>
+            <a:spLocks noGrp="1"/>
+          </p:cNvSpPr>
+          <p:nvPr>
+            <p:ph type="ftr" sz="quarter" idx="11"/>
+          </p:nvPr>
+        </p:nvSpPr>
+        <p:spPr/>
+        <p:txBody>
+          <a:bodyPr/>
+          <a:lstStyle/>
+          <a:p>
+            <a:r>
+              <a:rPr lang="en-US" dirty="0"/>
+              <a:t>Zillow Data - </a:t>
+            </a:r>
+            <a:r>
+              <a:rPr lang="en-US" dirty="0" err="1"/>
+              <a:t>Copy.ipynb</a:t>
+            </a:r>
+            <a:endParaRPr lang="en-US" dirty="0"/>
+          </a:p>
+        </p:txBody>
+      </p:sp>
       <p:pic>
         <p:nvPicPr>
-          <p:cNvPr id="17" name="Content Placeholder 16">
+          <p:cNvPr id="7" name="Content Placeholder 6">
             <a:extLst>
               <a:ext uri="{FF2B5EF4-FFF2-40B4-BE49-F238E27FC236}">
-                <a16:creationId xmlns:a16="http://schemas.microsoft.com/office/drawing/2014/main" id="{70F59381-5A80-4767-8FE0-C7F559193CC6}"/>
+                <a16:creationId xmlns:a16="http://schemas.microsoft.com/office/drawing/2014/main" id="{CDA03D88-19A2-4A23-A154-0705A3BA35EA}"/>
               </a:ext>
             </a:extLst>
           </p:cNvPr>
@@ -7489,44 +7522,11 @@
         </p:blipFill>
         <p:spPr>
           <a:xfrm>
-            <a:off x="2993925" y="1921542"/>
+            <a:off x="2993925" y="1920240"/>
             <a:ext cx="6204149" cy="4024313"/>
           </a:xfrm>
         </p:spPr>
       </p:pic>
-      <p:sp>
-        <p:nvSpPr>
-          <p:cNvPr id="3" name="Footer Placeholder 2">
-            <a:extLst>
-              <a:ext uri="{FF2B5EF4-FFF2-40B4-BE49-F238E27FC236}">
-                <a16:creationId xmlns:a16="http://schemas.microsoft.com/office/drawing/2014/main" id="{8B4E291D-D615-4D68-9909-0E26081B3315}"/>
-              </a:ext>
-            </a:extLst>
-          </p:cNvPr>
-          <p:cNvSpPr>
-            <a:spLocks noGrp="1"/>
-          </p:cNvSpPr>
-          <p:nvPr>
-            <p:ph type="ftr" sz="quarter" idx="11"/>
-          </p:nvPr>
-        </p:nvSpPr>
-        <p:spPr/>
-        <p:txBody>
-          <a:bodyPr/>
-          <a:lstStyle/>
-          <a:p>
-            <a:r>
-              <a:rPr lang="en-US" dirty="0"/>
-              <a:t>Zillow Data - </a:t>
-            </a:r>
-            <a:r>
-              <a:rPr lang="en-US" dirty="0" err="1"/>
-              <a:t>Copy.ipynb</a:t>
-            </a:r>
-            <a:endParaRPr lang="en-US" dirty="0"/>
-          </a:p>
-        </p:txBody>
-      </p:sp>
     </p:spTree>
     <p:extLst>
       <p:ext uri="{BB962C8B-B14F-4D97-AF65-F5344CB8AC3E}">
@@ -7590,12 +7590,45 @@
           </a:p>
         </p:txBody>
       </p:sp>
+      <p:sp>
+        <p:nvSpPr>
+          <p:cNvPr id="3" name="Footer Placeholder 2">
+            <a:extLst>
+              <a:ext uri="{FF2B5EF4-FFF2-40B4-BE49-F238E27FC236}">
+                <a16:creationId xmlns:a16="http://schemas.microsoft.com/office/drawing/2014/main" id="{38ED66D4-EA9B-47E7-9630-1CCA7F4B0DFB}"/>
+              </a:ext>
+            </a:extLst>
+          </p:cNvPr>
+          <p:cNvSpPr>
+            <a:spLocks noGrp="1"/>
+          </p:cNvSpPr>
+          <p:nvPr>
+            <p:ph type="ftr" sz="quarter" idx="11"/>
+          </p:nvPr>
+        </p:nvSpPr>
+        <p:spPr/>
+        <p:txBody>
+          <a:bodyPr/>
+          <a:lstStyle/>
+          <a:p>
+            <a:r>
+              <a:rPr lang="en-US" dirty="0"/>
+              <a:t>Salary Data - </a:t>
+            </a:r>
+            <a:r>
+              <a:rPr lang="en-US" dirty="0" err="1"/>
+              <a:t>Copy.ipynb</a:t>
+            </a:r>
+            <a:endParaRPr lang="en-US" dirty="0"/>
+          </a:p>
+        </p:txBody>
+      </p:sp>
       <p:pic>
         <p:nvPicPr>
-          <p:cNvPr id="5" name="Content Placeholder 4">
+          <p:cNvPr id="8" name="Content Placeholder 7">
             <a:extLst>
               <a:ext uri="{FF2B5EF4-FFF2-40B4-BE49-F238E27FC236}">
-                <a16:creationId xmlns:a16="http://schemas.microsoft.com/office/drawing/2014/main" id="{A3A5A1CF-DEC6-403A-9015-B6E9C976B5BB}"/>
+                <a16:creationId xmlns:a16="http://schemas.microsoft.com/office/drawing/2014/main" id="{41D4C642-A6FE-45E6-AD4A-B319CDD82E1C}"/>
               </a:ext>
             </a:extLst>
           </p:cNvPr>
@@ -7615,43 +7648,10 @@
         <p:spPr>
           <a:xfrm>
             <a:off x="2990088" y="1920240"/>
-            <a:ext cx="6208776" cy="4051287"/>
+            <a:ext cx="6208776" cy="4051286"/>
           </a:xfrm>
         </p:spPr>
       </p:pic>
-      <p:sp>
-        <p:nvSpPr>
-          <p:cNvPr id="3" name="Footer Placeholder 2">
-            <a:extLst>
-              <a:ext uri="{FF2B5EF4-FFF2-40B4-BE49-F238E27FC236}">
-                <a16:creationId xmlns:a16="http://schemas.microsoft.com/office/drawing/2014/main" id="{38ED66D4-EA9B-47E7-9630-1CCA7F4B0DFB}"/>
-              </a:ext>
-            </a:extLst>
-          </p:cNvPr>
-          <p:cNvSpPr>
-            <a:spLocks noGrp="1"/>
-          </p:cNvSpPr>
-          <p:nvPr>
-            <p:ph type="ftr" sz="quarter" idx="11"/>
-          </p:nvPr>
-        </p:nvSpPr>
-        <p:spPr/>
-        <p:txBody>
-          <a:bodyPr/>
-          <a:lstStyle/>
-          <a:p>
-            <a:r>
-              <a:rPr lang="en-US" dirty="0"/>
-              <a:t>Salary Data - </a:t>
-            </a:r>
-            <a:r>
-              <a:rPr lang="en-US" dirty="0" err="1"/>
-              <a:t>Copy.ipynb</a:t>
-            </a:r>
-            <a:endParaRPr lang="en-US" dirty="0"/>
-          </a:p>
-        </p:txBody>
-      </p:sp>
     </p:spTree>
     <p:extLst>
       <p:ext uri="{BB962C8B-B14F-4D97-AF65-F5344CB8AC3E}">

</xml_diff>